<commit_message>
Stop using tutorial01 - instead incorporate the instructions
</commit_message>
<xml_diff>
--- a/lectures/mini_django.pptx
+++ b/lectures/mini_django.pptx
@@ -3330,10 +3330,15 @@
             <p:ph type="subTitle" idx="1"/>
           </p:nvPr>
         </p:nvSpPr>
-        <p:spPr/>
+        <p:spPr>
+          <a:xfrm>
+            <a:off x="1524000" y="3602037"/>
+            <a:ext cx="9144000" cy="2255423"/>
+          </a:xfrm>
+        </p:spPr>
         <p:txBody>
           <a:bodyPr>
-            <a:normAutofit lnSpcReduction="10000"/>
+            <a:normAutofit/>
           </a:bodyPr>
           <a:lstStyle/>
           <a:p>
@@ -3372,6 +3377,17 @@
               <a:rPr lang="en-US" dirty="0"/>
               <a:t>/</a:t>
             </a:r>
+          </a:p>
+          <a:p>
+            <a:r>
+              <a:rPr lang="en-US" dirty="0"/>
+              <a:t>http://www.dj4e.com/lectures/</a:t>
+            </a:r>
+            <a:r>
+              <a:rPr lang="en-US" dirty="0" err="1"/>
+              <a:t>mini_django.pptx</a:t>
+            </a:r>
+            <a:endParaRPr lang="en-US" dirty="0"/>
           </a:p>
         </p:txBody>
       </p:sp>

</xml_diff>